<commit_message>
Power Point Agregar captura simulacion
</commit_message>
<xml_diff>
--- a/Modelo de Robos STR.pptx
+++ b/Modelo de Robos STR.pptx
@@ -10,6 +10,7 @@
     <p:sldId id="258" r:id="rId4"/>
     <p:sldId id="261" r:id="rId5"/>
     <p:sldId id="260" r:id="rId6"/>
+    <p:sldId id="263" r:id="rId7"/>
   </p:sldIdLst>
   <p:sldSz cx="12192000" cy="6858000"/>
   <p:notesSz cx="6858000" cy="9144000"/>
@@ -7602,6 +7603,175 @@
 </p:sld>
 </file>
 
+<file path=ppt/slides/slide6.xml><?xml version="1.0" encoding="utf-8"?>
+<p:sld xmlns:a="http://schemas.openxmlformats.org/drawingml/2006/main" xmlns:r="http://schemas.openxmlformats.org/officeDocument/2006/relationships" xmlns:p="http://schemas.openxmlformats.org/presentationml/2006/main">
+  <p:cSld>
+    <p:spTree>
+      <p:nvGrpSpPr>
+        <p:cNvPr id="1" name=""/>
+        <p:cNvGrpSpPr/>
+        <p:nvPr/>
+      </p:nvGrpSpPr>
+      <p:grpSpPr>
+        <a:xfrm>
+          <a:off x="0" y="0"/>
+          <a:ext cx="0" cy="0"/>
+          <a:chOff x="0" y="0"/>
+          <a:chExt cx="0" cy="0"/>
+        </a:xfrm>
+      </p:grpSpPr>
+      <p:sp>
+        <p:nvSpPr>
+          <p:cNvPr id="2" name="Title 1">
+            <a:extLst>
+              <a:ext uri="{FF2B5EF4-FFF2-40B4-BE49-F238E27FC236}">
+                <a16:creationId xmlns:a16="http://schemas.microsoft.com/office/drawing/2014/main" id="{D618551F-9435-468A-8501-1CCD8DC3FAD0}"/>
+              </a:ext>
+            </a:extLst>
+          </p:cNvPr>
+          <p:cNvSpPr>
+            <a:spLocks noGrp="1"/>
+          </p:cNvSpPr>
+          <p:nvPr>
+            <p:ph type="title"/>
+          </p:nvPr>
+        </p:nvSpPr>
+        <p:spPr/>
+        <p:txBody>
+          <a:bodyPr/>
+          <a:lstStyle/>
+          <a:p>
+            <a:r>
+              <a:rPr lang="es-AR" dirty="0"/>
+              <a:t>Simulación</a:t>
+            </a:r>
+          </a:p>
+        </p:txBody>
+      </p:sp>
+      <p:pic>
+        <p:nvPicPr>
+          <p:cNvPr id="1028" name="Picture 4">
+            <a:extLst>
+              <a:ext uri="{FF2B5EF4-FFF2-40B4-BE49-F238E27FC236}">
+                <a16:creationId xmlns:a16="http://schemas.microsoft.com/office/drawing/2014/main" id="{FD71D299-F401-4FC0-90C3-B02845756FE9}"/>
+              </a:ext>
+            </a:extLst>
+          </p:cNvPr>
+          <p:cNvPicPr>
+            <a:picLocks noGrp="1" noChangeAspect="1" noChangeArrowheads="1"/>
+          </p:cNvPicPr>
+          <p:nvPr>
+            <p:ph idx="1"/>
+          </p:nvPr>
+        </p:nvPicPr>
+        <p:blipFill>
+          <a:blip r:embed="rId2">
+            <a:extLst>
+              <a:ext uri="{28A0092B-C50C-407E-A947-70E740481C1C}">
+                <a14:useLocalDpi xmlns:a14="http://schemas.microsoft.com/office/drawing/2010/main" val="0"/>
+              </a:ext>
+            </a:extLst>
+          </a:blip>
+          <a:srcRect/>
+          <a:stretch>
+            <a:fillRect/>
+          </a:stretch>
+        </p:blipFill>
+        <p:spPr bwMode="auto">
+          <a:xfrm>
+            <a:off x="1103313" y="2068450"/>
+            <a:ext cx="8947150" cy="4164138"/>
+          </a:xfrm>
+          <a:prstGeom prst="rect">
+            <a:avLst/>
+          </a:prstGeom>
+          <a:noFill/>
+          <a:extLst>
+            <a:ext uri="{909E8E84-426E-40DD-AFC4-6F175D3DCCD1}">
+              <a14:hiddenFill xmlns:a14="http://schemas.microsoft.com/office/drawing/2010/main">
+                <a:solidFill>
+                  <a:srgbClr val="FFFFFF"/>
+                </a:solidFill>
+              </a14:hiddenFill>
+            </a:ext>
+          </a:extLst>
+        </p:spPr>
+      </p:pic>
+      <p:sp>
+        <p:nvSpPr>
+          <p:cNvPr id="7" name="TextBox 6">
+            <a:extLst>
+              <a:ext uri="{FF2B5EF4-FFF2-40B4-BE49-F238E27FC236}">
+                <a16:creationId xmlns:a16="http://schemas.microsoft.com/office/drawing/2014/main" id="{F24168E1-E197-4732-9CB1-B2038717734F}"/>
+              </a:ext>
+            </a:extLst>
+          </p:cNvPr>
+          <p:cNvSpPr txBox="1"/>
+          <p:nvPr/>
+        </p:nvSpPr>
+        <p:spPr>
+          <a:xfrm>
+            <a:off x="4114800" y="452718"/>
+            <a:ext cx="6043353" cy="1200329"/>
+          </a:xfrm>
+          <a:prstGeom prst="rect">
+            <a:avLst/>
+          </a:prstGeom>
+          <a:noFill/>
+        </p:spPr>
+        <p:txBody>
+          <a:bodyPr wrap="square">
+            <a:spAutoFit/>
+          </a:bodyPr>
+          <a:lstStyle/>
+          <a:p>
+            <a:pPr algn="l"/>
+            <a:r>
+              <a:rPr lang="es-AR" sz="1800" dirty="0">
+                <a:solidFill>
+                  <a:schemeClr val="tx2">
+                    <a:alpha val="60000"/>
+                  </a:schemeClr>
+                </a:solidFill>
+              </a:rPr>
+              <a:t>Como se ve, obtenemos en 25 horas unos 9 robos, con la mayor cantidad de robos sucediendo entre las 0AM y las 7AM.</a:t>
+            </a:r>
+          </a:p>
+          <a:p>
+            <a:pPr algn="l"/>
+            <a:r>
+              <a:rPr lang="es-AR" dirty="0">
+                <a:solidFill>
+                  <a:schemeClr val="tx2">
+                    <a:alpha val="60000"/>
+                  </a:schemeClr>
+                </a:solidFill>
+              </a:rPr>
+              <a:t>Además, ocurrió una muerte en esos 9 robos.</a:t>
+            </a:r>
+            <a:endParaRPr lang="en-US" sz="1800" dirty="0">
+              <a:solidFill>
+                <a:schemeClr val="tx2">
+                  <a:alpha val="60000"/>
+                </a:schemeClr>
+              </a:solidFill>
+            </a:endParaRPr>
+          </a:p>
+        </p:txBody>
+      </p:sp>
+    </p:spTree>
+    <p:extLst>
+      <p:ext uri="{BB962C8B-B14F-4D97-AF65-F5344CB8AC3E}">
+        <p14:creationId xmlns:p14="http://schemas.microsoft.com/office/powerpoint/2010/main" val="1031212475"/>
+      </p:ext>
+    </p:extLst>
+  </p:cSld>
+  <p:clrMapOvr>
+    <a:masterClrMapping/>
+  </p:clrMapOvr>
+</p:sld>
+</file>
+
 <file path=ppt/theme/theme1.xml><?xml version="1.0" encoding="utf-8"?>
 <a:theme xmlns:a="http://schemas.openxmlformats.org/drawingml/2006/main" name="Ion">
   <a:themeElements>

</xml_diff>